<commit_message>
28/03 - add login and register pages, bugs fixed
</commit_message>
<xml_diff>
--- a/Assignment1/presentation-teamproject.pptx
+++ b/Assignment1/presentation-teamproject.pptx
@@ -138,257 +138,6 @@
 </p:presentation>
 </file>
 
-<file path=ppt/charts/chart1.xml><?xml version="1.0" encoding="utf-8"?>
-<c:chartSpace xmlns:c="http://schemas.openxmlformats.org/drawingml/2006/chart" xmlns:a="http://schemas.openxmlformats.org/drawingml/2006/main" xmlns:r="http://schemas.openxmlformats.org/officeDocument/2006/relationships" xmlns:c16r2="http://schemas.microsoft.com/office/drawing/2015/06/chart">
-  <c:date1904 val="0"/>
-  <c:lang val="en-US"/>
-  <c:roundedCorners val="0"/>
-  <mc:AlternateContent xmlns:mc="http://schemas.openxmlformats.org/markup-compatibility/2006">
-    <mc:Choice xmlns:c14="http://schemas.microsoft.com/office/drawing/2007/8/2/chart" Requires="c14">
-      <c14:style val="118"/>
-    </mc:Choice>
-    <mc:Fallback>
-      <c:style val="18"/>
-    </mc:Fallback>
-  </mc:AlternateContent>
-  <c:chart>
-    <c:autoTitleDeleted val="0"/>
-    <c:plotArea>
-      <c:layout/>
-      <c:barChart>
-        <c:barDir val="col"/>
-        <c:grouping val="clustered"/>
-        <c:varyColors val="0"/>
-        <c:ser>
-          <c:idx val="0"/>
-          <c:order val="0"/>
-          <c:tx>
-            <c:strRef>
-              <c:f>Sheet1!$B$1</c:f>
-              <c:strCache>
-                <c:ptCount val="1"/>
-                <c:pt idx="0">
-                  <c:v>Started on</c:v>
-                </c:pt>
-              </c:strCache>
-            </c:strRef>
-          </c:tx>
-          <c:invertIfNegative val="0"/>
-          <c:cat>
-            <c:strRef>
-              <c:f>Sheet1!$A$2:$A$7</c:f>
-              <c:strCache>
-                <c:ptCount val="4"/>
-                <c:pt idx="0">
-                  <c:v>Study Java, PHP, MYSQL</c:v>
-                </c:pt>
-                <c:pt idx="1">
-                  <c:v>Initial implementation</c:v>
-                </c:pt>
-                <c:pt idx="2">
-                  <c:v>Testing </c:v>
-                </c:pt>
-                <c:pt idx="3">
-                  <c:v>group implementation</c:v>
-                </c:pt>
-              </c:strCache>
-            </c:strRef>
-          </c:cat>
-          <c:val>
-            <c:numRef>
-              <c:f>Sheet1!$B$2:$B$7</c:f>
-              <c:numCache>
-                <c:formatCode>m/d/yy</c:formatCode>
-                <c:ptCount val="6"/>
-                <c:pt idx="0">
-                  <c:v>42408</c:v>
-                </c:pt>
-                <c:pt idx="1">
-                  <c:v>42422</c:v>
-                </c:pt>
-              </c:numCache>
-            </c:numRef>
-          </c:val>
-          <c:extLst>
-            <c:ext xmlns:c16="http://schemas.microsoft.com/office/drawing/2014/chart" uri="{C3380CC4-5D6E-409C-BE32-E72D297353CC}">
-              <c16:uniqueId val="{00000000-E714-4EAB-9A5E-16DBC049CC31}"/>
-            </c:ext>
-          </c:extLst>
-        </c:ser>
-        <c:ser>
-          <c:idx val="1"/>
-          <c:order val="1"/>
-          <c:tx>
-            <c:strRef>
-              <c:f>Sheet1!$C$1</c:f>
-              <c:strCache>
-                <c:ptCount val="1"/>
-                <c:pt idx="0">
-                  <c:v>Finished on</c:v>
-                </c:pt>
-              </c:strCache>
-            </c:strRef>
-          </c:tx>
-          <c:invertIfNegative val="0"/>
-          <c:cat>
-            <c:strRef>
-              <c:f>Sheet1!$A$2:$A$7</c:f>
-              <c:strCache>
-                <c:ptCount val="4"/>
-                <c:pt idx="0">
-                  <c:v>Study Java, PHP, MYSQL</c:v>
-                </c:pt>
-                <c:pt idx="1">
-                  <c:v>Initial implementation</c:v>
-                </c:pt>
-                <c:pt idx="2">
-                  <c:v>Testing </c:v>
-                </c:pt>
-                <c:pt idx="3">
-                  <c:v>group implementation</c:v>
-                </c:pt>
-              </c:strCache>
-            </c:strRef>
-          </c:cat>
-          <c:val>
-            <c:numRef>
-              <c:f>Sheet1!$C$2:$C$7</c:f>
-              <c:numCache>
-                <c:formatCode>General</c:formatCode>
-                <c:ptCount val="6"/>
-                <c:pt idx="0" formatCode="m/d/yy">
-                  <c:v>42420</c:v>
-                </c:pt>
-              </c:numCache>
-            </c:numRef>
-          </c:val>
-          <c:extLst>
-            <c:ext xmlns:c16="http://schemas.microsoft.com/office/drawing/2014/chart" uri="{C3380CC4-5D6E-409C-BE32-E72D297353CC}">
-              <c16:uniqueId val="{00000001-E714-4EAB-9A5E-16DBC049CC31}"/>
-            </c:ext>
-          </c:extLst>
-        </c:ser>
-        <c:ser>
-          <c:idx val="2"/>
-          <c:order val="2"/>
-          <c:tx>
-            <c:strRef>
-              <c:f>Sheet1!$D$1</c:f>
-              <c:strCache>
-                <c:ptCount val="1"/>
-                <c:pt idx="0">
-                  <c:v>Expected </c:v>
-                </c:pt>
-              </c:strCache>
-            </c:strRef>
-          </c:tx>
-          <c:invertIfNegative val="0"/>
-          <c:cat>
-            <c:strRef>
-              <c:f>Sheet1!$A$2:$A$7</c:f>
-              <c:strCache>
-                <c:ptCount val="4"/>
-                <c:pt idx="0">
-                  <c:v>Study Java, PHP, MYSQL</c:v>
-                </c:pt>
-                <c:pt idx="1">
-                  <c:v>Initial implementation</c:v>
-                </c:pt>
-                <c:pt idx="2">
-                  <c:v>Testing </c:v>
-                </c:pt>
-                <c:pt idx="3">
-                  <c:v>group implementation</c:v>
-                </c:pt>
-              </c:strCache>
-            </c:strRef>
-          </c:cat>
-          <c:val>
-            <c:numRef>
-              <c:f>Sheet1!$D$2:$D$7</c:f>
-              <c:numCache>
-                <c:formatCode>General</c:formatCode>
-                <c:ptCount val="6"/>
-              </c:numCache>
-            </c:numRef>
-          </c:val>
-          <c:extLst>
-            <c:ext xmlns:c16="http://schemas.microsoft.com/office/drawing/2014/chart" uri="{C3380CC4-5D6E-409C-BE32-E72D297353CC}">
-              <c16:uniqueId val="{00000002-E714-4EAB-9A5E-16DBC049CC31}"/>
-            </c:ext>
-          </c:extLst>
-        </c:ser>
-        <c:dLbls>
-          <c:showLegendKey val="0"/>
-          <c:showVal val="0"/>
-          <c:showCatName val="0"/>
-          <c:showSerName val="0"/>
-          <c:showPercent val="0"/>
-          <c:showBubbleSize val="0"/>
-        </c:dLbls>
-        <c:gapWidth val="150"/>
-        <c:axId val="340466984"/>
-        <c:axId val="340467376"/>
-      </c:barChart>
-      <c:catAx>
-        <c:axId val="340466984"/>
-        <c:scaling>
-          <c:orientation val="minMax"/>
-        </c:scaling>
-        <c:delete val="0"/>
-        <c:axPos val="b"/>
-        <c:numFmt formatCode="General" sourceLinked="0"/>
-        <c:majorTickMark val="out"/>
-        <c:minorTickMark val="none"/>
-        <c:tickLblPos val="nextTo"/>
-        <c:crossAx val="340467376"/>
-        <c:crosses val="autoZero"/>
-        <c:auto val="1"/>
-        <c:lblAlgn val="ctr"/>
-        <c:lblOffset val="100"/>
-        <c:noMultiLvlLbl val="0"/>
-      </c:catAx>
-      <c:valAx>
-        <c:axId val="340467376"/>
-        <c:scaling>
-          <c:orientation val="minMax"/>
-        </c:scaling>
-        <c:delete val="0"/>
-        <c:axPos val="l"/>
-        <c:majorGridlines/>
-        <c:numFmt formatCode="m/d/yy" sourceLinked="1"/>
-        <c:majorTickMark val="out"/>
-        <c:minorTickMark val="none"/>
-        <c:tickLblPos val="nextTo"/>
-        <c:crossAx val="340466984"/>
-        <c:crosses val="autoZero"/>
-        <c:crossBetween val="between"/>
-      </c:valAx>
-    </c:plotArea>
-    <c:legend>
-      <c:legendPos val="r"/>
-      <c:overlay val="0"/>
-    </c:legend>
-    <c:plotVisOnly val="1"/>
-    <c:dispBlanksAs val="gap"/>
-    <c:showDLblsOverMax val="0"/>
-  </c:chart>
-  <c:txPr>
-    <a:bodyPr/>
-    <a:lstStyle/>
-    <a:p>
-      <a:pPr>
-        <a:defRPr sz="1800"/>
-      </a:pPr>
-      <a:endParaRPr lang="en-US"/>
-    </a:p>
-  </c:txPr>
-  <c:externalData r:id="rId1">
-    <c:autoUpdate val="0"/>
-  </c:externalData>
-</c:chartSpace>
-</file>
-
 <file path=ppt/notesMasters/notesMaster1.xml><?xml version="1.0" encoding="utf-8"?>
 <p:notesMaster xmlns:a="http://schemas.openxmlformats.org/drawingml/2006/main" xmlns:r="http://schemas.openxmlformats.org/officeDocument/2006/relationships" xmlns:p="http://schemas.openxmlformats.org/presentationml/2006/main">
   <p:cSld>
@@ -803,7 +552,7 @@
           <a:p>
             <a:fld id="{2BCBDD0E-9A00-4B2C-B265-1F41269CA837}" type="slidenum">
               <a:rPr lang="en-US"/>
-              <a:t>‹#›</a:t>
+              <a:t>1</a:t>
             </a:fld>
             <a:endParaRPr lang="en-US"/>
           </a:p>
@@ -887,7 +636,7 @@
           <a:p>
             <a:fld id="{2BCBDD0E-9A00-4B2C-B265-1F41269CA837}" type="slidenum">
               <a:rPr lang="en-US"/>
-              <a:t>‹#›</a:t>
+              <a:t>10</a:t>
             </a:fld>
             <a:endParaRPr lang="en-US"/>
           </a:p>
@@ -971,7 +720,7 @@
           <a:p>
             <a:fld id="{2BCBDD0E-9A00-4B2C-B265-1F41269CA837}" type="slidenum">
               <a:rPr lang="en-US"/>
-              <a:t>‹#›</a:t>
+              <a:t>11</a:t>
             </a:fld>
             <a:endParaRPr lang="en-US"/>
           </a:p>
@@ -1055,7 +804,7 @@
           <a:p>
             <a:fld id="{2BCBDD0E-9A00-4B2C-B265-1F41269CA837}" type="slidenum">
               <a:rPr lang="en-US"/>
-              <a:t>‹#›</a:t>
+              <a:t>12</a:t>
             </a:fld>
             <a:endParaRPr lang="en-US"/>
           </a:p>
@@ -1139,7 +888,7 @@
           <a:p>
             <a:fld id="{2BCBDD0E-9A00-4B2C-B265-1F41269CA837}" type="slidenum">
               <a:rPr lang="en-US"/>
-              <a:t>‹#›</a:t>
+              <a:t>13</a:t>
             </a:fld>
             <a:endParaRPr lang="en-US"/>
           </a:p>
@@ -1223,7 +972,7 @@
           <a:p>
             <a:fld id="{2BCBDD0E-9A00-4B2C-B265-1F41269CA837}" type="slidenum">
               <a:rPr lang="en-US"/>
-              <a:t>‹#›</a:t>
+              <a:t>14</a:t>
             </a:fld>
             <a:endParaRPr lang="en-US"/>
           </a:p>
@@ -1307,7 +1056,7 @@
           <a:p>
             <a:fld id="{2BCBDD0E-9A00-4B2C-B265-1F41269CA837}" type="slidenum">
               <a:rPr lang="en-US"/>
-              <a:t>‹#›</a:t>
+              <a:t>15</a:t>
             </a:fld>
             <a:endParaRPr lang="en-US"/>
           </a:p>
@@ -1391,7 +1140,7 @@
           <a:p>
             <a:fld id="{2BCBDD0E-9A00-4B2C-B265-1F41269CA837}" type="slidenum">
               <a:rPr lang="en-US"/>
-              <a:t>‹#›</a:t>
+              <a:t>16</a:t>
             </a:fld>
             <a:endParaRPr lang="en-US"/>
           </a:p>
@@ -1475,7 +1224,7 @@
           <a:p>
             <a:fld id="{2BCBDD0E-9A00-4B2C-B265-1F41269CA837}" type="slidenum">
               <a:rPr lang="en-US"/>
-              <a:t>‹#›</a:t>
+              <a:t>17</a:t>
             </a:fld>
             <a:endParaRPr lang="en-US"/>
           </a:p>
@@ -1559,7 +1308,7 @@
           <a:p>
             <a:fld id="{2BCBDD0E-9A00-4B2C-B265-1F41269CA837}" type="slidenum">
               <a:rPr lang="en-US"/>
-              <a:t>20</a:t>
+              <a:t>18</a:t>
             </a:fld>
             <a:endParaRPr lang="en-US"/>
           </a:p>
@@ -1568,7 +1317,7 @@
     </p:spTree>
     <p:extLst>
       <p:ext uri="{BB962C8B-B14F-4D97-AF65-F5344CB8AC3E}">
-        <p14:creationId xmlns:p14="http://schemas.microsoft.com/office/powerpoint/2010/main" val="1082953597"/>
+        <p14:creationId xmlns:p14="http://schemas.microsoft.com/office/powerpoint/2010/main" val="2024074168"/>
       </p:ext>
     </p:extLst>
   </p:cSld>
@@ -1643,7 +1392,7 @@
           <a:p>
             <a:fld id="{2BCBDD0E-9A00-4B2C-B265-1F41269CA837}" type="slidenum">
               <a:rPr lang="en-US"/>
-              <a:t>21</a:t>
+              <a:t>19</a:t>
             </a:fld>
             <a:endParaRPr lang="en-US"/>
           </a:p>
@@ -1652,7 +1401,7 @@
     </p:spTree>
     <p:extLst>
       <p:ext uri="{BB962C8B-B14F-4D97-AF65-F5344CB8AC3E}">
-        <p14:creationId xmlns:p14="http://schemas.microsoft.com/office/powerpoint/2010/main" val="321888043"/>
+        <p14:creationId xmlns:p14="http://schemas.microsoft.com/office/powerpoint/2010/main" val="4059014562"/>
       </p:ext>
     </p:extLst>
   </p:cSld>
@@ -1727,7 +1476,7 @@
           <a:p>
             <a:fld id="{2BCBDD0E-9A00-4B2C-B265-1F41269CA837}" type="slidenum">
               <a:rPr lang="en-US"/>
-              <a:t>‹#›</a:t>
+              <a:t>2</a:t>
             </a:fld>
             <a:endParaRPr lang="en-US"/>
           </a:p>
@@ -1811,7 +1560,7 @@
           <a:p>
             <a:fld id="{2BCBDD0E-9A00-4B2C-B265-1F41269CA837}" type="slidenum">
               <a:rPr lang="en-US"/>
-              <a:t>22</a:t>
+              <a:t>20</a:t>
             </a:fld>
             <a:endParaRPr lang="en-US"/>
           </a:p>
@@ -1820,7 +1569,7 @@
     </p:spTree>
     <p:extLst>
       <p:ext uri="{BB962C8B-B14F-4D97-AF65-F5344CB8AC3E}">
-        <p14:creationId xmlns:p14="http://schemas.microsoft.com/office/powerpoint/2010/main" val="3087391376"/>
+        <p14:creationId xmlns:p14="http://schemas.microsoft.com/office/powerpoint/2010/main" val="1082953597"/>
       </p:ext>
     </p:extLst>
   </p:cSld>
@@ -1895,6 +1644,174 @@
           <a:p>
             <a:fld id="{2BCBDD0E-9A00-4B2C-B265-1F41269CA837}" type="slidenum">
               <a:rPr lang="en-US"/>
+              <a:t>21</a:t>
+            </a:fld>
+            <a:endParaRPr lang="en-US"/>
+          </a:p>
+        </p:txBody>
+      </p:sp>
+    </p:spTree>
+    <p:extLst>
+      <p:ext uri="{BB962C8B-B14F-4D97-AF65-F5344CB8AC3E}">
+        <p14:creationId xmlns:p14="http://schemas.microsoft.com/office/powerpoint/2010/main" val="321888043"/>
+      </p:ext>
+    </p:extLst>
+  </p:cSld>
+  <p:clrMapOvr>
+    <a:masterClrMapping/>
+  </p:clrMapOvr>
+</p:notes>
+</file>
+
+<file path=ppt/notesSlides/notesSlide22.xml><?xml version="1.0" encoding="utf-8"?>
+<p:notes xmlns:a="http://schemas.openxmlformats.org/drawingml/2006/main" xmlns:r="http://schemas.openxmlformats.org/officeDocument/2006/relationships" xmlns:p="http://schemas.openxmlformats.org/presentationml/2006/main">
+  <p:cSld>
+    <p:spTree>
+      <p:nvGrpSpPr>
+        <p:cNvPr id="1" name=""/>
+        <p:cNvGrpSpPr/>
+        <p:nvPr/>
+      </p:nvGrpSpPr>
+      <p:grpSpPr>
+        <a:xfrm>
+          <a:off x="0" y="0"/>
+          <a:ext cx="0" cy="0"/>
+          <a:chOff x="0" y="0"/>
+          <a:chExt cx="0" cy="0"/>
+        </a:xfrm>
+      </p:grpSpPr>
+      <p:sp>
+        <p:nvSpPr>
+          <p:cNvPr id="2" name="Slide Image Placeholder 1"/>
+          <p:cNvSpPr>
+            <a:spLocks noGrp="1" noRot="1" noChangeAspect="1"/>
+          </p:cNvSpPr>
+          <p:nvPr>
+            <p:ph type="sldImg"/>
+          </p:nvPr>
+        </p:nvSpPr>
+        <p:spPr/>
+      </p:sp>
+      <p:sp>
+        <p:nvSpPr>
+          <p:cNvPr id="3" name="Notes Placeholder 2"/>
+          <p:cNvSpPr>
+            <a:spLocks noGrp="1"/>
+          </p:cNvSpPr>
+          <p:nvPr>
+            <p:ph type="body" idx="1"/>
+          </p:nvPr>
+        </p:nvSpPr>
+        <p:spPr/>
+        <p:txBody>
+          <a:bodyPr/>
+          <a:lstStyle/>
+          <a:p>
+            <a:endParaRPr lang="en-US"/>
+          </a:p>
+        </p:txBody>
+      </p:sp>
+      <p:sp>
+        <p:nvSpPr>
+          <p:cNvPr id="4" name="Slide Number Placeholder 3"/>
+          <p:cNvSpPr>
+            <a:spLocks noGrp="1"/>
+          </p:cNvSpPr>
+          <p:nvPr>
+            <p:ph type="sldNum" sz="quarter" idx="10"/>
+          </p:nvPr>
+        </p:nvSpPr>
+        <p:spPr/>
+        <p:txBody>
+          <a:bodyPr/>
+          <a:lstStyle/>
+          <a:p>
+            <a:fld id="{2BCBDD0E-9A00-4B2C-B265-1F41269CA837}" type="slidenum">
+              <a:rPr lang="en-US"/>
+              <a:t>22</a:t>
+            </a:fld>
+            <a:endParaRPr lang="en-US"/>
+          </a:p>
+        </p:txBody>
+      </p:sp>
+    </p:spTree>
+    <p:extLst>
+      <p:ext uri="{BB962C8B-B14F-4D97-AF65-F5344CB8AC3E}">
+        <p14:creationId xmlns:p14="http://schemas.microsoft.com/office/powerpoint/2010/main" val="3087391376"/>
+      </p:ext>
+    </p:extLst>
+  </p:cSld>
+  <p:clrMapOvr>
+    <a:masterClrMapping/>
+  </p:clrMapOvr>
+</p:notes>
+</file>
+
+<file path=ppt/notesSlides/notesSlide23.xml><?xml version="1.0" encoding="utf-8"?>
+<p:notes xmlns:a="http://schemas.openxmlformats.org/drawingml/2006/main" xmlns:r="http://schemas.openxmlformats.org/officeDocument/2006/relationships" xmlns:p="http://schemas.openxmlformats.org/presentationml/2006/main">
+  <p:cSld>
+    <p:spTree>
+      <p:nvGrpSpPr>
+        <p:cNvPr id="1" name=""/>
+        <p:cNvGrpSpPr/>
+        <p:nvPr/>
+      </p:nvGrpSpPr>
+      <p:grpSpPr>
+        <a:xfrm>
+          <a:off x="0" y="0"/>
+          <a:ext cx="0" cy="0"/>
+          <a:chOff x="0" y="0"/>
+          <a:chExt cx="0" cy="0"/>
+        </a:xfrm>
+      </p:grpSpPr>
+      <p:sp>
+        <p:nvSpPr>
+          <p:cNvPr id="2" name="Slide Image Placeholder 1"/>
+          <p:cNvSpPr>
+            <a:spLocks noGrp="1" noRot="1" noChangeAspect="1"/>
+          </p:cNvSpPr>
+          <p:nvPr>
+            <p:ph type="sldImg"/>
+          </p:nvPr>
+        </p:nvSpPr>
+        <p:spPr/>
+      </p:sp>
+      <p:sp>
+        <p:nvSpPr>
+          <p:cNvPr id="3" name="Notes Placeholder 2"/>
+          <p:cNvSpPr>
+            <a:spLocks noGrp="1"/>
+          </p:cNvSpPr>
+          <p:nvPr>
+            <p:ph type="body" idx="1"/>
+          </p:nvPr>
+        </p:nvSpPr>
+        <p:spPr/>
+        <p:txBody>
+          <a:bodyPr/>
+          <a:lstStyle/>
+          <a:p>
+            <a:endParaRPr lang="en-US"/>
+          </a:p>
+        </p:txBody>
+      </p:sp>
+      <p:sp>
+        <p:nvSpPr>
+          <p:cNvPr id="4" name="Slide Number Placeholder 3"/>
+          <p:cNvSpPr>
+            <a:spLocks noGrp="1"/>
+          </p:cNvSpPr>
+          <p:nvPr>
+            <p:ph type="sldNum" sz="quarter" idx="10"/>
+          </p:nvPr>
+        </p:nvSpPr>
+        <p:spPr/>
+        <p:txBody>
+          <a:bodyPr/>
+          <a:lstStyle/>
+          <a:p>
+            <a:fld id="{2BCBDD0E-9A00-4B2C-B265-1F41269CA837}" type="slidenum">
+              <a:rPr lang="en-US"/>
               <a:t>23</a:t>
             </a:fld>
             <a:endParaRPr lang="en-US"/>
@@ -1914,7 +1831,7 @@
 </p:notes>
 </file>
 
-<file path=ppt/notesSlides/notesSlide22.xml><?xml version="1.0" encoding="utf-8"?>
+<file path=ppt/notesSlides/notesSlide24.xml><?xml version="1.0" encoding="utf-8"?>
 <p:notes xmlns:a="http://schemas.openxmlformats.org/drawingml/2006/main" xmlns:r="http://schemas.openxmlformats.org/officeDocument/2006/relationships" xmlns:p="http://schemas.openxmlformats.org/presentationml/2006/main">
   <p:cSld>
     <p:spTree>
@@ -2063,7 +1980,7 @@
           <a:p>
             <a:fld id="{2BCBDD0E-9A00-4B2C-B265-1F41269CA837}" type="slidenum">
               <a:rPr lang="en-US"/>
-              <a:t>‹#›</a:t>
+              <a:t>3</a:t>
             </a:fld>
             <a:endParaRPr lang="en-US"/>
           </a:p>
@@ -2147,7 +2064,7 @@
           <a:p>
             <a:fld id="{2BCBDD0E-9A00-4B2C-B265-1F41269CA837}" type="slidenum">
               <a:rPr lang="en-US"/>
-              <a:t>‹#›</a:t>
+              <a:t>4</a:t>
             </a:fld>
             <a:endParaRPr lang="en-US"/>
           </a:p>
@@ -2231,7 +2148,7 @@
           <a:p>
             <a:fld id="{2BCBDD0E-9A00-4B2C-B265-1F41269CA837}" type="slidenum">
               <a:rPr lang="en-US"/>
-              <a:t>‹#›</a:t>
+              <a:t>5</a:t>
             </a:fld>
             <a:endParaRPr lang="en-US"/>
           </a:p>
@@ -2315,7 +2232,7 @@
           <a:p>
             <a:fld id="{2BCBDD0E-9A00-4B2C-B265-1F41269CA837}" type="slidenum">
               <a:rPr lang="en-US"/>
-              <a:t>‹#›</a:t>
+              <a:t>6</a:t>
             </a:fld>
             <a:endParaRPr lang="en-US"/>
           </a:p>
@@ -2399,7 +2316,7 @@
           <a:p>
             <a:fld id="{2BCBDD0E-9A00-4B2C-B265-1F41269CA837}" type="slidenum">
               <a:rPr lang="en-US"/>
-              <a:t>‹#›</a:t>
+              <a:t>7</a:t>
             </a:fld>
             <a:endParaRPr lang="en-US"/>
           </a:p>
@@ -2483,7 +2400,7 @@
           <a:p>
             <a:fld id="{2BCBDD0E-9A00-4B2C-B265-1F41269CA837}" type="slidenum">
               <a:rPr lang="en-US"/>
-              <a:t>‹#›</a:t>
+              <a:t>8</a:t>
             </a:fld>
             <a:endParaRPr lang="en-US"/>
           </a:p>
@@ -2567,7 +2484,7 @@
           <a:p>
             <a:fld id="{2BCBDD0E-9A00-4B2C-B265-1F41269CA837}" type="slidenum">
               <a:rPr lang="en-US"/>
-              <a:t>‹#›</a:t>
+              <a:t>9</a:t>
             </a:fld>
             <a:endParaRPr lang="en-US"/>
           </a:p>
@@ -6598,35 +6515,41 @@
           <a:bodyPr/>
           <a:lstStyle/>
           <a:p>
-            <a:endParaRPr lang="pt-BR"/>
-          </a:p>
-        </p:txBody>
-      </p:sp>
-      <p:graphicFrame>
-        <p:nvGraphicFramePr>
-          <p:cNvPr id="4" name="Content Placeholder 3"/>
-          <p:cNvGraphicFramePr>
-            <a:graphicFrameLocks noGrp="1"/>
-          </p:cNvGraphicFramePr>
+            <a:r>
+              <a:rPr lang="pt-BR" dirty="0">
+                <a:latin typeface="Rockwell Condensed" charset="0"/>
+              </a:rPr>
+              <a:t>PLANNING</a:t>
+            </a:r>
+            <a:endParaRPr lang="en-US" dirty="0">
+              <a:latin typeface="Rockwell Condensed" charset="0"/>
+            </a:endParaRPr>
+          </a:p>
+        </p:txBody>
+      </p:sp>
+      <p:pic>
+        <p:nvPicPr>
+          <p:cNvPr id="5" name="Content Placeholder 4" descr="Image"/>
+          <p:cNvPicPr>
+            <a:picLocks noGrp="1" noChangeAspect="1"/>
+          </p:cNvPicPr>
           <p:nvPr>
             <p:ph idx="1"/>
-            <p:extLst>
-              <p:ext uri="{D42A27DB-BD31-4B8C-83A1-F6EECF244321}">
-                <p14:modId xmlns:p14="http://schemas.microsoft.com/office/powerpoint/2010/main" val="2646817217"/>
-              </p:ext>
-            </p:extLst>
-          </p:nvPr>
-        </p:nvGraphicFramePr>
-        <p:xfrm>
-          <a:off x="1069975" y="2120900"/>
-          <a:ext cx="10058400" cy="4051300"/>
-        </p:xfrm>
-        <a:graphic>
-          <a:graphicData uri="http://schemas.openxmlformats.org/drawingml/2006/chart">
-            <c:chart xmlns:c="http://schemas.openxmlformats.org/drawingml/2006/chart" xmlns:r="http://schemas.openxmlformats.org/officeDocument/2006/relationships" r:id="rId3"/>
-          </a:graphicData>
-        </a:graphic>
-      </p:graphicFrame>
+          </p:nvPr>
+        </p:nvPicPr>
+        <p:blipFill>
+          <a:blip r:embed="rId3"/>
+          <a:stretch>
+            <a:fillRect/>
+          </a:stretch>
+        </p:blipFill>
+        <p:spPr>
+          <a:xfrm>
+            <a:off x="2609850" y="1546225"/>
+            <a:ext cx="7076586" cy="5273621"/>
+          </a:xfrm>
+        </p:spPr>
+      </p:pic>
     </p:spTree>
     <p:extLst>
       <p:ext uri="{BB962C8B-B14F-4D97-AF65-F5344CB8AC3E}">
@@ -7303,7 +7226,7 @@
           <p:nvPr/>
         </p:nvPicPr>
         <p:blipFill>
-          <a:blip r:embed="rId2"/>
+          <a:blip r:embed="rId3"/>
           <a:stretch>
             <a:fillRect/>
           </a:stretch>
@@ -7397,7 +7320,9 @@
           </a:xfrm>
         </p:spPr>
         <p:txBody>
-          <a:bodyPr/>
+          <a:bodyPr>
+            <a:normAutofit lnSpcReduction="10000"/>
+          </a:bodyPr>
           <a:lstStyle/>
           <a:p>
             <a:r>
@@ -7541,7 +7466,58 @@
               <a:rPr lang="pt-BR" dirty="0" err="1"/>
               <a:t>members</a:t>
             </a:r>
-            <a:endParaRPr lang="pt-BR" dirty="0"/>
+            <a:r>
+              <a:rPr lang="pt-BR" dirty="0"/>
+              <a:t>, </a:t>
+            </a:r>
+            <a:r>
+              <a:rPr lang="pt-BR" dirty="0" err="1"/>
+              <a:t>search</a:t>
+            </a:r>
+            <a:r>
+              <a:rPr lang="pt-BR" dirty="0"/>
+              <a:t> for bugs </a:t>
+            </a:r>
+            <a:r>
+              <a:rPr lang="pt-BR" dirty="0" err="1"/>
+              <a:t>and</a:t>
+            </a:r>
+            <a:r>
+              <a:rPr lang="pt-BR" dirty="0"/>
+              <a:t> </a:t>
+            </a:r>
+            <a:r>
+              <a:rPr lang="pt-BR" dirty="0" err="1"/>
+              <a:t>fix</a:t>
+            </a:r>
+            <a:r>
+              <a:rPr lang="pt-BR" dirty="0"/>
+              <a:t> </a:t>
+            </a:r>
+            <a:r>
+              <a:rPr lang="pt-BR" dirty="0" err="1"/>
+              <a:t>them</a:t>
+            </a:r>
+            <a:r>
+              <a:rPr lang="pt-BR" dirty="0"/>
+              <a:t> (</a:t>
+            </a:r>
+            <a:r>
+              <a:rPr lang="pt-BR" dirty="0" err="1"/>
+              <a:t>Quality</a:t>
+            </a:r>
+            <a:r>
+              <a:rPr lang="pt-BR" dirty="0"/>
+              <a:t> </a:t>
+            </a:r>
+            <a:r>
+              <a:rPr lang="pt-BR" dirty="0" err="1"/>
+              <a:t>assurance</a:t>
+            </a:r>
+            <a:r>
+              <a:rPr lang="pt-BR" dirty="0"/>
+              <a:t>).</a:t>
+            </a:r>
           </a:p>
           <a:p>
             <a:pPr marL="0" indent="0">
@@ -7707,7 +7683,12 @@
             <p:ph type="title"/>
           </p:nvPr>
         </p:nvSpPr>
-        <p:spPr/>
+        <p:spPr>
+          <a:xfrm>
+            <a:off x="679079" y="191555"/>
+            <a:ext cx="10058400" cy="1609344"/>
+          </a:xfrm>
+        </p:spPr>
         <p:txBody>
           <a:bodyPr/>
           <a:lstStyle/>
@@ -7719,25 +7700,30 @@
           </a:p>
         </p:txBody>
       </p:sp>
-      <p:sp>
-        <p:nvSpPr>
-          <p:cNvPr id="3" name="Content Placeholder 2"/>
-          <p:cNvSpPr>
-            <a:spLocks noGrp="1"/>
-          </p:cNvSpPr>
-          <p:nvPr>
-            <p:ph idx="1"/>
-          </p:nvPr>
-        </p:nvSpPr>
-        <p:spPr/>
-        <p:txBody>
-          <a:bodyPr/>
-          <a:lstStyle/>
-          <a:p>
-            <a:endParaRPr lang="pt-BR" dirty="0"/>
-          </a:p>
-        </p:txBody>
-      </p:sp>
+      <p:pic>
+        <p:nvPicPr>
+          <p:cNvPr id="5" name="Picture 4"/>
+          <p:cNvPicPr>
+            <a:picLocks noChangeAspect="1"/>
+          </p:cNvPicPr>
+          <p:nvPr/>
+        </p:nvPicPr>
+        <p:blipFill>
+          <a:blip r:embed="rId3"/>
+          <a:stretch>
+            <a:fillRect/>
+          </a:stretch>
+        </p:blipFill>
+        <p:spPr>
+          <a:xfrm>
+            <a:off x="187325" y="1666875"/>
+            <a:ext cx="11561763" cy="4039211"/>
+          </a:xfrm>
+          <a:prstGeom prst="rect">
+            <a:avLst/>
+          </a:prstGeom>
+        </p:spPr>
+      </p:pic>
     </p:spTree>
     <p:extLst>
       <p:ext uri="{BB962C8B-B14F-4D97-AF65-F5344CB8AC3E}">
@@ -7826,7 +7812,7 @@
           <a:p>
             <a:r>
               <a:rPr lang="en-GB" dirty="0"/>
-              <a:t>Employee reads the table and contacts the suppliers</a:t>
+              <a:t>System contacts the suppliers</a:t>
             </a:r>
             <a:endParaRPr lang="pt-BR" dirty="0"/>
           </a:p>
@@ -8591,25 +8577,6 @@
           <a:chExt cx="0" cy="0"/>
         </a:xfrm>
       </p:grpSpPr>
-      <p:sp>
-        <p:nvSpPr>
-          <p:cNvPr id="3" name="Espaço Reservado para Conteúdo 2"/>
-          <p:cNvSpPr>
-            <a:spLocks noGrp="1"/>
-          </p:cNvSpPr>
-          <p:nvPr>
-            <p:ph idx="1"/>
-          </p:nvPr>
-        </p:nvSpPr>
-        <p:spPr/>
-        <p:txBody>
-          <a:bodyPr/>
-          <a:lstStyle/>
-          <a:p>
-            <a:endParaRPr lang="en-GB"/>
-          </a:p>
-        </p:txBody>
-      </p:sp>
       <p:pic>
         <p:nvPicPr>
           <p:cNvPr id="4" name="Espaço Reservado para Conteúdo 3"/>
@@ -8632,7 +8599,7 @@
         </p:blipFill>
         <p:spPr>
           <a:xfrm>
-            <a:off x="734996" y="995825"/>
+            <a:off x="686149" y="966517"/>
             <a:ext cx="10529825" cy="5005729"/>
           </a:xfrm>
           <a:prstGeom prst="rect">
@@ -8705,7 +8672,9 @@
         </p:nvSpPr>
         <p:spPr/>
         <p:txBody>
-          <a:bodyPr/>
+          <a:bodyPr vert="horz" lIns="91440" tIns="45720" rIns="91440" bIns="45720" rtlCol="0" anchor="t">
+            <a:normAutofit/>
+          </a:bodyPr>
           <a:lstStyle/>
           <a:p>
             <a:r>
@@ -8721,6 +8690,17 @@
             </a:r>
           </a:p>
           <a:p>
+            <a:pPr lvl="2"/>
+            <a:r>
+              <a:rPr lang="en-GB" dirty="0"/>
+              <a:t>(credit/debit card, cash)</a:t>
+            </a:r>
+          </a:p>
+          <a:p>
+            <a:pPr lvl="1"/>
+            <a:endParaRPr lang="en-GB" dirty="0"/>
+          </a:p>
+          <a:p>
             <a:pPr lvl="1"/>
             <a:r>
               <a:rPr lang="en-GB" dirty="0"/>
@@ -8728,6 +8708,28 @@
             </a:r>
           </a:p>
           <a:p>
+            <a:pPr lvl="2"/>
+            <a:r>
+              <a:rPr lang="en-GB" dirty="0"/>
+              <a:t>(credit/debit card, </a:t>
+            </a:r>
+            <a:r>
+              <a:rPr lang="en-GB" dirty="0" err="1"/>
+              <a:t>Paypal</a:t>
+            </a:r>
+            <a:r>
+              <a:rPr lang="en-GB" dirty="0"/>
+              <a:t>)</a:t>
+            </a:r>
+          </a:p>
+          <a:p>
+            <a:pPr lvl="1"/>
+            <a:endParaRPr lang="en-GB" dirty="0"/>
+          </a:p>
+          <a:p>
+            <a:pPr marL="0" indent="0">
+              <a:buNone/>
+            </a:pPr>
             <a:r>
               <a:rPr lang="en-GB" dirty="0"/>
               <a:t> </a:t>

</xml_diff>